<commit_message>
Ändrat solsken till minuter
</commit_message>
<xml_diff>
--- a/Unicorn Co.pptx
+++ b/Unicorn Co.pptx
@@ -111,6 +111,11 @@
       </a:defRPr>
     </a:lvl9pPr>
   </p:defaultTextStyle>
+  <p:extLst>
+    <p:ext uri="{EFAFB233-063F-42B5-8137-9DF3F51BA10A}">
+      <p15:sldGuideLst xmlns:p15="http://schemas.microsoft.com/office/powerpoint/2012/main"/>
+    </p:ext>
+  </p:extLst>
 </p:presentation>
 </file>
 
@@ -263,7 +268,7 @@
           <a:p>
             <a:fld id="{2B328789-B4B4-467E-8737-573E270C015E}" type="datetimeFigureOut">
               <a:rPr lang="sv-SE" smtClean="0"/>
-              <a:t>2019-03-29</a:t>
+              <a:t>2019-04-02</a:t>
             </a:fld>
             <a:endParaRPr lang="sv-SE"/>
           </a:p>
@@ -463,7 +468,7 @@
           <a:p>
             <a:fld id="{2B328789-B4B4-467E-8737-573E270C015E}" type="datetimeFigureOut">
               <a:rPr lang="sv-SE" smtClean="0"/>
-              <a:t>2019-03-29</a:t>
+              <a:t>2019-04-02</a:t>
             </a:fld>
             <a:endParaRPr lang="sv-SE"/>
           </a:p>
@@ -673,7 +678,7 @@
           <a:p>
             <a:fld id="{2B328789-B4B4-467E-8737-573E270C015E}" type="datetimeFigureOut">
               <a:rPr lang="sv-SE" smtClean="0"/>
-              <a:t>2019-03-29</a:t>
+              <a:t>2019-04-02</a:t>
             </a:fld>
             <a:endParaRPr lang="sv-SE"/>
           </a:p>
@@ -873,7 +878,7 @@
           <a:p>
             <a:fld id="{2B328789-B4B4-467E-8737-573E270C015E}" type="datetimeFigureOut">
               <a:rPr lang="sv-SE" smtClean="0"/>
-              <a:t>2019-03-29</a:t>
+              <a:t>2019-04-02</a:t>
             </a:fld>
             <a:endParaRPr lang="sv-SE"/>
           </a:p>
@@ -1149,7 +1154,7 @@
           <a:p>
             <a:fld id="{2B328789-B4B4-467E-8737-573E270C015E}" type="datetimeFigureOut">
               <a:rPr lang="sv-SE" smtClean="0"/>
-              <a:t>2019-03-29</a:t>
+              <a:t>2019-04-02</a:t>
             </a:fld>
             <a:endParaRPr lang="sv-SE"/>
           </a:p>
@@ -1417,7 +1422,7 @@
           <a:p>
             <a:fld id="{2B328789-B4B4-467E-8737-573E270C015E}" type="datetimeFigureOut">
               <a:rPr lang="sv-SE" smtClean="0"/>
-              <a:t>2019-03-29</a:t>
+              <a:t>2019-04-02</a:t>
             </a:fld>
             <a:endParaRPr lang="sv-SE"/>
           </a:p>
@@ -1832,7 +1837,7 @@
           <a:p>
             <a:fld id="{2B328789-B4B4-467E-8737-573E270C015E}" type="datetimeFigureOut">
               <a:rPr lang="sv-SE" smtClean="0"/>
-              <a:t>2019-03-29</a:t>
+              <a:t>2019-04-02</a:t>
             </a:fld>
             <a:endParaRPr lang="sv-SE"/>
           </a:p>
@@ -1974,7 +1979,7 @@
           <a:p>
             <a:fld id="{2B328789-B4B4-467E-8737-573E270C015E}" type="datetimeFigureOut">
               <a:rPr lang="sv-SE" smtClean="0"/>
-              <a:t>2019-03-29</a:t>
+              <a:t>2019-04-02</a:t>
             </a:fld>
             <a:endParaRPr lang="sv-SE"/>
           </a:p>
@@ -2087,7 +2092,7 @@
           <a:p>
             <a:fld id="{2B328789-B4B4-467E-8737-573E270C015E}" type="datetimeFigureOut">
               <a:rPr lang="sv-SE" smtClean="0"/>
-              <a:t>2019-03-29</a:t>
+              <a:t>2019-04-02</a:t>
             </a:fld>
             <a:endParaRPr lang="sv-SE"/>
           </a:p>
@@ -2400,7 +2405,7 @@
           <a:p>
             <a:fld id="{2B328789-B4B4-467E-8737-573E270C015E}" type="datetimeFigureOut">
               <a:rPr lang="sv-SE" smtClean="0"/>
-              <a:t>2019-03-29</a:t>
+              <a:t>2019-04-02</a:t>
             </a:fld>
             <a:endParaRPr lang="sv-SE"/>
           </a:p>
@@ -2689,7 +2694,7 @@
           <a:p>
             <a:fld id="{2B328789-B4B4-467E-8737-573E270C015E}" type="datetimeFigureOut">
               <a:rPr lang="sv-SE" smtClean="0"/>
-              <a:t>2019-03-29</a:t>
+              <a:t>2019-04-02</a:t>
             </a:fld>
             <a:endParaRPr lang="sv-SE"/>
           </a:p>
@@ -2932,7 +2937,7 @@
           <a:p>
             <a:fld id="{2B328789-B4B4-467E-8737-573E270C015E}" type="datetimeFigureOut">
               <a:rPr lang="sv-SE" smtClean="0"/>
-              <a:t>2019-03-29</a:t>
+              <a:t>2019-04-02</a:t>
             </a:fld>
             <a:endParaRPr lang="sv-SE"/>
           </a:p>
@@ -5632,7 +5637,7 @@
           <a:lstStyle/>
           <a:p>
             <a:r>
-              <a:rPr lang="en-US" kern="1200" dirty="0" err="1">
+              <a:rPr lang="en-US" b="1" kern="1200" dirty="0" err="1">
                 <a:solidFill>
                   <a:schemeClr val="tx1"/>
                 </a:solidFill>
@@ -5642,7 +5647,7 @@
               </a:rPr>
               <a:t>Slutsats</a:t>
             </a:r>
-            <a:endParaRPr lang="en-US" kern="1200" dirty="0">
+            <a:endParaRPr lang="en-US" b="1" kern="1200" dirty="0">
               <a:solidFill>
                 <a:schemeClr val="tx1"/>
               </a:solidFill>

</xml_diff>

<commit_message>
Lagt till en grid för KPIer
</commit_message>
<xml_diff>
--- a/Unicorn Co.pptx
+++ b/Unicorn Co.pptx
@@ -11,8 +11,9 @@
     <p:sldId id="258" r:id="rId5"/>
     <p:sldId id="259" r:id="rId6"/>
     <p:sldId id="262" r:id="rId7"/>
-    <p:sldId id="263" r:id="rId8"/>
-    <p:sldId id="264" r:id="rId9"/>
+    <p:sldId id="265" r:id="rId8"/>
+    <p:sldId id="263" r:id="rId9"/>
+    <p:sldId id="264" r:id="rId10"/>
   </p:sldIdLst>
   <p:sldSz cx="12192000" cy="6858000"/>
   <p:notesSz cx="6858000" cy="9144000"/>
@@ -268,7 +269,7 @@
           <a:p>
             <a:fld id="{2B328789-B4B4-467E-8737-573E270C015E}" type="datetimeFigureOut">
               <a:rPr lang="sv-SE" smtClean="0"/>
-              <a:t>2019-04-02</a:t>
+              <a:t>2019-04-03</a:t>
             </a:fld>
             <a:endParaRPr lang="sv-SE"/>
           </a:p>
@@ -468,7 +469,7 @@
           <a:p>
             <a:fld id="{2B328789-B4B4-467E-8737-573E270C015E}" type="datetimeFigureOut">
               <a:rPr lang="sv-SE" smtClean="0"/>
-              <a:t>2019-04-02</a:t>
+              <a:t>2019-04-03</a:t>
             </a:fld>
             <a:endParaRPr lang="sv-SE"/>
           </a:p>
@@ -678,7 +679,7 @@
           <a:p>
             <a:fld id="{2B328789-B4B4-467E-8737-573E270C015E}" type="datetimeFigureOut">
               <a:rPr lang="sv-SE" smtClean="0"/>
-              <a:t>2019-04-02</a:t>
+              <a:t>2019-04-03</a:t>
             </a:fld>
             <a:endParaRPr lang="sv-SE"/>
           </a:p>
@@ -878,7 +879,7 @@
           <a:p>
             <a:fld id="{2B328789-B4B4-467E-8737-573E270C015E}" type="datetimeFigureOut">
               <a:rPr lang="sv-SE" smtClean="0"/>
-              <a:t>2019-04-02</a:t>
+              <a:t>2019-04-03</a:t>
             </a:fld>
             <a:endParaRPr lang="sv-SE"/>
           </a:p>
@@ -1154,7 +1155,7 @@
           <a:p>
             <a:fld id="{2B328789-B4B4-467E-8737-573E270C015E}" type="datetimeFigureOut">
               <a:rPr lang="sv-SE" smtClean="0"/>
-              <a:t>2019-04-02</a:t>
+              <a:t>2019-04-03</a:t>
             </a:fld>
             <a:endParaRPr lang="sv-SE"/>
           </a:p>
@@ -1422,7 +1423,7 @@
           <a:p>
             <a:fld id="{2B328789-B4B4-467E-8737-573E270C015E}" type="datetimeFigureOut">
               <a:rPr lang="sv-SE" smtClean="0"/>
-              <a:t>2019-04-02</a:t>
+              <a:t>2019-04-03</a:t>
             </a:fld>
             <a:endParaRPr lang="sv-SE"/>
           </a:p>
@@ -1837,7 +1838,7 @@
           <a:p>
             <a:fld id="{2B328789-B4B4-467E-8737-573E270C015E}" type="datetimeFigureOut">
               <a:rPr lang="sv-SE" smtClean="0"/>
-              <a:t>2019-04-02</a:t>
+              <a:t>2019-04-03</a:t>
             </a:fld>
             <a:endParaRPr lang="sv-SE"/>
           </a:p>
@@ -1979,7 +1980,7 @@
           <a:p>
             <a:fld id="{2B328789-B4B4-467E-8737-573E270C015E}" type="datetimeFigureOut">
               <a:rPr lang="sv-SE" smtClean="0"/>
-              <a:t>2019-04-02</a:t>
+              <a:t>2019-04-03</a:t>
             </a:fld>
             <a:endParaRPr lang="sv-SE"/>
           </a:p>
@@ -2092,7 +2093,7 @@
           <a:p>
             <a:fld id="{2B328789-B4B4-467E-8737-573E270C015E}" type="datetimeFigureOut">
               <a:rPr lang="sv-SE" smtClean="0"/>
-              <a:t>2019-04-02</a:t>
+              <a:t>2019-04-03</a:t>
             </a:fld>
             <a:endParaRPr lang="sv-SE"/>
           </a:p>
@@ -2405,7 +2406,7 @@
           <a:p>
             <a:fld id="{2B328789-B4B4-467E-8737-573E270C015E}" type="datetimeFigureOut">
               <a:rPr lang="sv-SE" smtClean="0"/>
-              <a:t>2019-04-02</a:t>
+              <a:t>2019-04-03</a:t>
             </a:fld>
             <a:endParaRPr lang="sv-SE"/>
           </a:p>
@@ -2694,7 +2695,7 @@
           <a:p>
             <a:fld id="{2B328789-B4B4-467E-8737-573E270C015E}" type="datetimeFigureOut">
               <a:rPr lang="sv-SE" smtClean="0"/>
-              <a:t>2019-04-02</a:t>
+              <a:t>2019-04-03</a:t>
             </a:fld>
             <a:endParaRPr lang="sv-SE"/>
           </a:p>
@@ -2937,7 +2938,7 @@
           <a:p>
             <a:fld id="{2B328789-B4B4-467E-8737-573E270C015E}" type="datetimeFigureOut">
               <a:rPr lang="sv-SE" smtClean="0"/>
-              <a:t>2019-04-02</a:t>
+              <a:t>2019-04-03</a:t>
             </a:fld>
             <a:endParaRPr lang="sv-SE"/>
           </a:p>
@@ -5159,6 +5160,430 @@
       </p:grpSpPr>
       <p:sp>
         <p:nvSpPr>
+          <p:cNvPr id="22" name="Rectangle 15">
+            <a:extLst>
+              <a:ext uri="{FF2B5EF4-FFF2-40B4-BE49-F238E27FC236}">
+                <a16:creationId xmlns:a16="http://schemas.microsoft.com/office/drawing/2014/main" id="{2F19B711-C590-44D1-9AA8-9F143B0ED58A}"/>
+              </a:ext>
+              <a:ext uri="{C183D7F6-B498-43B3-948B-1728B52AA6E4}">
+                <adec:decorative xmlns:adec="http://schemas.microsoft.com/office/drawing/2017/decorative" val="1"/>
+              </a:ext>
+            </a:extLst>
+          </p:cNvPr>
+          <p:cNvSpPr>
+            <a:spLocks noGrp="1" noRot="1" noChangeAspect="1" noMove="1" noResize="1" noEditPoints="1" noAdjustHandles="1" noChangeArrowheads="1" noChangeShapeType="1" noTextEdit="1"/>
+          </p:cNvSpPr>
+          <p:nvPr>
+            <p:extLst>
+              <p:ext uri="{386F3935-93C4-4BCD-93E2-E3B085C9AB24}">
+                <p16:designElem xmlns:p16="http://schemas.microsoft.com/office/powerpoint/2015/main" val="1"/>
+              </p:ext>
+            </p:extLst>
+          </p:nvPr>
+        </p:nvSpPr>
+        <p:spPr>
+          <a:xfrm>
+            <a:off x="0" y="0"/>
+            <a:ext cx="12192000" cy="6858000"/>
+          </a:xfrm>
+          <a:prstGeom prst="rect">
+            <a:avLst/>
+          </a:prstGeom>
+          <a:solidFill>
+            <a:schemeClr val="tx1">
+              <a:lumMod val="50000"/>
+              <a:lumOff val="50000"/>
+              <a:alpha val="50000"/>
+            </a:schemeClr>
+          </a:solidFill>
+          <a:ln>
+            <a:noFill/>
+          </a:ln>
+        </p:spPr>
+        <p:style>
+          <a:lnRef idx="2">
+            <a:schemeClr val="accent1">
+              <a:shade val="50000"/>
+            </a:schemeClr>
+          </a:lnRef>
+          <a:fillRef idx="1">
+            <a:schemeClr val="accent1"/>
+          </a:fillRef>
+          <a:effectRef idx="0">
+            <a:schemeClr val="accent1"/>
+          </a:effectRef>
+          <a:fontRef idx="minor">
+            <a:schemeClr val="lt1"/>
+          </a:fontRef>
+        </p:style>
+        <p:txBody>
+          <a:bodyPr rtlCol="0" anchor="ctr"/>
+          <a:lstStyle/>
+          <a:p>
+            <a:pPr algn="ctr"/>
+            <a:endParaRPr lang="en-US"/>
+          </a:p>
+        </p:txBody>
+      </p:sp>
+      <p:sp>
+        <p:nvSpPr>
+          <p:cNvPr id="23" name="Rectangle 17">
+            <a:extLst>
+              <a:ext uri="{FF2B5EF4-FFF2-40B4-BE49-F238E27FC236}">
+                <a16:creationId xmlns:a16="http://schemas.microsoft.com/office/drawing/2014/main" id="{C0C79CF2-6A1C-4636-84CE-ABB2BE191D23}"/>
+              </a:ext>
+              <a:ext uri="{C183D7F6-B498-43B3-948B-1728B52AA6E4}">
+                <adec:decorative xmlns:adec="http://schemas.microsoft.com/office/drawing/2017/decorative" val="1"/>
+              </a:ext>
+            </a:extLst>
+          </p:cNvPr>
+          <p:cNvSpPr>
+            <a:spLocks noGrp="1" noRot="1" noChangeAspect="1" noMove="1" noResize="1" noEditPoints="1" noAdjustHandles="1" noChangeArrowheads="1" noChangeShapeType="1" noTextEdit="1"/>
+          </p:cNvSpPr>
+          <p:nvPr>
+            <p:extLst>
+              <p:ext uri="{386F3935-93C4-4BCD-93E2-E3B085C9AB24}">
+                <p16:designElem xmlns:p16="http://schemas.microsoft.com/office/powerpoint/2015/main" val="1"/>
+              </p:ext>
+            </p:extLst>
+          </p:nvPr>
+        </p:nvSpPr>
+        <p:spPr>
+          <a:xfrm>
+            <a:off x="477012" y="480060"/>
+            <a:ext cx="11237976" cy="5897880"/>
+          </a:xfrm>
+          <a:prstGeom prst="rect">
+            <a:avLst/>
+          </a:prstGeom>
+          <a:noFill/>
+          <a:ln>
+            <a:solidFill>
+              <a:srgbClr val="FFFFFF"/>
+            </a:solidFill>
+          </a:ln>
+        </p:spPr>
+        <p:style>
+          <a:lnRef idx="2">
+            <a:schemeClr val="accent1">
+              <a:shade val="50000"/>
+            </a:schemeClr>
+          </a:lnRef>
+          <a:fillRef idx="1">
+            <a:schemeClr val="accent1"/>
+          </a:fillRef>
+          <a:effectRef idx="0">
+            <a:schemeClr val="accent1"/>
+          </a:effectRef>
+          <a:fontRef idx="minor">
+            <a:schemeClr val="lt1"/>
+          </a:fontRef>
+        </p:style>
+        <p:txBody>
+          <a:bodyPr rtlCol="0" anchor="ctr"/>
+          <a:lstStyle/>
+          <a:p>
+            <a:pPr algn="ctr"/>
+            <a:endParaRPr lang="en-US"/>
+          </a:p>
+        </p:txBody>
+      </p:sp>
+      <p:sp>
+        <p:nvSpPr>
+          <p:cNvPr id="24" name="Rectangle 19">
+            <a:extLst>
+              <a:ext uri="{FF2B5EF4-FFF2-40B4-BE49-F238E27FC236}">
+                <a16:creationId xmlns:a16="http://schemas.microsoft.com/office/drawing/2014/main" id="{7A5D17DF-AD65-402C-A95C-F13C770C9FCD}"/>
+              </a:ext>
+              <a:ext uri="{C183D7F6-B498-43B3-948B-1728B52AA6E4}">
+                <adec:decorative xmlns:adec="http://schemas.microsoft.com/office/drawing/2017/decorative" val="1"/>
+              </a:ext>
+            </a:extLst>
+          </p:cNvPr>
+          <p:cNvSpPr>
+            <a:spLocks noGrp="1" noRot="1" noChangeAspect="1" noMove="1" noResize="1" noEditPoints="1" noAdjustHandles="1" noChangeArrowheads="1" noChangeShapeType="1" noTextEdit="1"/>
+          </p:cNvSpPr>
+          <p:nvPr>
+            <p:extLst>
+              <p:ext uri="{386F3935-93C4-4BCD-93E2-E3B085C9AB24}">
+                <p16:designElem xmlns:p16="http://schemas.microsoft.com/office/powerpoint/2015/main" val="1"/>
+              </p:ext>
+            </p:extLst>
+          </p:nvPr>
+        </p:nvSpPr>
+        <p:spPr>
+          <a:xfrm>
+            <a:off x="643466" y="643468"/>
+            <a:ext cx="10905067" cy="5571066"/>
+          </a:xfrm>
+          <a:prstGeom prst="rect">
+            <a:avLst/>
+          </a:prstGeom>
+          <a:solidFill>
+            <a:srgbClr val="FFFFFF"/>
+          </a:solidFill>
+          <a:ln>
+            <a:noFill/>
+          </a:ln>
+        </p:spPr>
+        <p:style>
+          <a:lnRef idx="2">
+            <a:schemeClr val="accent1">
+              <a:shade val="50000"/>
+            </a:schemeClr>
+          </a:lnRef>
+          <a:fillRef idx="1">
+            <a:schemeClr val="accent1"/>
+          </a:fillRef>
+          <a:effectRef idx="0">
+            <a:schemeClr val="accent1"/>
+          </a:effectRef>
+          <a:fontRef idx="minor">
+            <a:schemeClr val="lt1"/>
+          </a:fontRef>
+        </p:style>
+        <p:txBody>
+          <a:bodyPr rtlCol="0" anchor="ctr"/>
+          <a:lstStyle/>
+          <a:p>
+            <a:pPr algn="ctr"/>
+            <a:endParaRPr lang="en-US"/>
+          </a:p>
+        </p:txBody>
+      </p:sp>
+      <p:pic>
+        <p:nvPicPr>
+          <p:cNvPr id="9" name="Picture 8" descr="A screenshot of text&#10;&#10;Description generated with very high confidence">
+            <a:extLst>
+              <a:ext uri="{FF2B5EF4-FFF2-40B4-BE49-F238E27FC236}">
+                <a16:creationId xmlns:a16="http://schemas.microsoft.com/office/drawing/2014/main" id="{3B4A88FE-AD0F-47F3-ABC4-E308995D124A}"/>
+              </a:ext>
+            </a:extLst>
+          </p:cNvPr>
+          <p:cNvPicPr>
+            <a:picLocks noChangeAspect="1"/>
+          </p:cNvPicPr>
+          <p:nvPr/>
+        </p:nvPicPr>
+        <p:blipFill>
+          <a:blip r:embed="rId2">
+            <a:extLst>
+              <a:ext uri="{28A0092B-C50C-407E-A947-70E740481C1C}">
+                <a14:useLocalDpi xmlns:a14="http://schemas.microsoft.com/office/drawing/2010/main" val="0"/>
+              </a:ext>
+            </a:extLst>
+          </a:blip>
+          <a:stretch>
+            <a:fillRect/>
+          </a:stretch>
+        </p:blipFill>
+        <p:spPr>
+          <a:xfrm>
+            <a:off x="1120485" y="957566"/>
+            <a:ext cx="3695859" cy="1776304"/>
+          </a:xfrm>
+          <a:prstGeom prst="rect">
+            <a:avLst/>
+          </a:prstGeom>
+        </p:spPr>
+      </p:pic>
+      <p:pic>
+        <p:nvPicPr>
+          <p:cNvPr id="11" name="Picture 10" descr="A screenshot of a cell phone&#10;&#10;Description generated with very high confidence">
+            <a:extLst>
+              <a:ext uri="{FF2B5EF4-FFF2-40B4-BE49-F238E27FC236}">
+                <a16:creationId xmlns:a16="http://schemas.microsoft.com/office/drawing/2014/main" id="{DA5F3038-F57D-4AD5-BC43-66AC229E1C5E}"/>
+              </a:ext>
+            </a:extLst>
+          </p:cNvPr>
+          <p:cNvPicPr>
+            <a:picLocks noChangeAspect="1"/>
+          </p:cNvPicPr>
+          <p:nvPr/>
+        </p:nvPicPr>
+        <p:blipFill>
+          <a:blip r:embed="rId3">
+            <a:extLst>
+              <a:ext uri="{28A0092B-C50C-407E-A947-70E740481C1C}">
+                <a14:useLocalDpi xmlns:a14="http://schemas.microsoft.com/office/drawing/2010/main" val="0"/>
+              </a:ext>
+            </a:extLst>
+          </a:blip>
+          <a:stretch>
+            <a:fillRect/>
+          </a:stretch>
+        </p:blipFill>
+        <p:spPr>
+          <a:xfrm>
+            <a:off x="4509765" y="2786434"/>
+            <a:ext cx="3467909" cy="1619343"/>
+          </a:xfrm>
+          <a:prstGeom prst="rect">
+            <a:avLst/>
+          </a:prstGeom>
+        </p:spPr>
+      </p:pic>
+      <p:pic>
+        <p:nvPicPr>
+          <p:cNvPr id="13" name="Picture 12" descr="A screenshot of a computer screen&#10;&#10;Description generated with very high confidence">
+            <a:extLst>
+              <a:ext uri="{FF2B5EF4-FFF2-40B4-BE49-F238E27FC236}">
+                <a16:creationId xmlns:a16="http://schemas.microsoft.com/office/drawing/2014/main" id="{91967F16-7063-4D9D-A7F5-AF334E7D3E88}"/>
+              </a:ext>
+            </a:extLst>
+          </p:cNvPr>
+          <p:cNvPicPr>
+            <a:picLocks noChangeAspect="1"/>
+          </p:cNvPicPr>
+          <p:nvPr/>
+        </p:nvPicPr>
+        <p:blipFill>
+          <a:blip r:embed="rId4">
+            <a:extLst>
+              <a:ext uri="{28A0092B-C50C-407E-A947-70E740481C1C}">
+                <a14:useLocalDpi xmlns:a14="http://schemas.microsoft.com/office/drawing/2010/main" val="0"/>
+              </a:ext>
+            </a:extLst>
+          </a:blip>
+          <a:stretch>
+            <a:fillRect/>
+          </a:stretch>
+        </p:blipFill>
+        <p:spPr>
+          <a:xfrm>
+            <a:off x="7594387" y="4483498"/>
+            <a:ext cx="3378413" cy="1486240"/>
+          </a:xfrm>
+          <a:prstGeom prst="rect">
+            <a:avLst/>
+          </a:prstGeom>
+        </p:spPr>
+      </p:pic>
+      <p:cxnSp>
+        <p:nvCxnSpPr>
+          <p:cNvPr id="15" name="Connector: Elbow 14">
+            <a:extLst>
+              <a:ext uri="{FF2B5EF4-FFF2-40B4-BE49-F238E27FC236}">
+                <a16:creationId xmlns:a16="http://schemas.microsoft.com/office/drawing/2014/main" id="{928DA381-EFF3-41E9-869F-D20124E2108F}"/>
+              </a:ext>
+            </a:extLst>
+          </p:cNvPr>
+          <p:cNvCxnSpPr>
+            <a:cxnSpLocks/>
+            <a:stCxn id="9" idx="2"/>
+            <a:endCxn id="11" idx="1"/>
+          </p:cNvCxnSpPr>
+          <p:nvPr/>
+        </p:nvCxnSpPr>
+        <p:spPr>
+          <a:xfrm rot="16200000" flipH="1">
+            <a:off x="3307972" y="2394313"/>
+            <a:ext cx="862236" cy="1541350"/>
+          </a:xfrm>
+          <a:prstGeom prst="bentConnector2">
+            <a:avLst/>
+          </a:prstGeom>
+          <a:ln w="28575">
+            <a:tailEnd type="triangle"/>
+          </a:ln>
+        </p:spPr>
+        <p:style>
+          <a:lnRef idx="1">
+            <a:schemeClr val="accent1"/>
+          </a:lnRef>
+          <a:fillRef idx="0">
+            <a:schemeClr val="accent1"/>
+          </a:fillRef>
+          <a:effectRef idx="0">
+            <a:schemeClr val="accent1"/>
+          </a:effectRef>
+          <a:fontRef idx="minor">
+            <a:schemeClr val="tx1"/>
+          </a:fontRef>
+        </p:style>
+      </p:cxnSp>
+      <p:cxnSp>
+        <p:nvCxnSpPr>
+          <p:cNvPr id="27" name="Connector: Elbow 26">
+            <a:extLst>
+              <a:ext uri="{FF2B5EF4-FFF2-40B4-BE49-F238E27FC236}">
+                <a16:creationId xmlns:a16="http://schemas.microsoft.com/office/drawing/2014/main" id="{76D4771E-823B-40B9-A21F-6964397D2A40}"/>
+              </a:ext>
+            </a:extLst>
+          </p:cNvPr>
+          <p:cNvCxnSpPr>
+            <a:stCxn id="11" idx="2"/>
+            <a:endCxn id="13" idx="1"/>
+          </p:cNvCxnSpPr>
+          <p:nvPr/>
+        </p:nvCxnSpPr>
+        <p:spPr>
+          <a:xfrm rot="16200000" flipH="1">
+            <a:off x="6508633" y="4140863"/>
+            <a:ext cx="820841" cy="1350667"/>
+          </a:xfrm>
+          <a:prstGeom prst="bentConnector2">
+            <a:avLst/>
+          </a:prstGeom>
+          <a:ln w="28575">
+            <a:tailEnd type="triangle"/>
+          </a:ln>
+        </p:spPr>
+        <p:style>
+          <a:lnRef idx="1">
+            <a:schemeClr val="accent1"/>
+          </a:lnRef>
+          <a:fillRef idx="0">
+            <a:schemeClr val="accent1"/>
+          </a:fillRef>
+          <a:effectRef idx="0">
+            <a:schemeClr val="accent1"/>
+          </a:effectRef>
+          <a:fontRef idx="minor">
+            <a:schemeClr val="tx1"/>
+          </a:fontRef>
+        </p:style>
+      </p:cxnSp>
+    </p:spTree>
+    <p:extLst>
+      <p:ext uri="{BB962C8B-B14F-4D97-AF65-F5344CB8AC3E}">
+        <p14:creationId xmlns:p14="http://schemas.microsoft.com/office/powerpoint/2010/main" val="3240976115"/>
+      </p:ext>
+    </p:extLst>
+  </p:cSld>
+  <p:clrMapOvr>
+    <a:masterClrMapping/>
+  </p:clrMapOvr>
+</p:sld>
+</file>
+
+<file path=ppt/slides/slide8.xml><?xml version="1.0" encoding="utf-8"?>
+<p:sld xmlns:a="http://schemas.openxmlformats.org/drawingml/2006/main" xmlns:r="http://schemas.openxmlformats.org/officeDocument/2006/relationships" xmlns:p="http://schemas.openxmlformats.org/presentationml/2006/main">
+  <p:cSld>
+    <p:bg>
+      <p:bgPr>
+        <a:solidFill>
+          <a:schemeClr val="bg1"/>
+        </a:solidFill>
+        <a:effectLst/>
+      </p:bgPr>
+    </p:bg>
+    <p:spTree>
+      <p:nvGrpSpPr>
+        <p:cNvPr id="1" name=""/>
+        <p:cNvGrpSpPr/>
+        <p:nvPr/>
+      </p:nvGrpSpPr>
+      <p:grpSpPr>
+        <a:xfrm>
+          <a:off x="0" y="0"/>
+          <a:ext cx="0" cy="0"/>
+          <a:chOff x="0" y="0"/>
+          <a:chExt cx="0" cy="0"/>
+        </a:xfrm>
+      </p:grpSpPr>
+      <p:sp>
+        <p:nvSpPr>
           <p:cNvPr id="36" name="Rectangle 35">
             <a:extLst>
               <a:ext uri="{FF2B5EF4-FFF2-40B4-BE49-F238E27FC236}">
@@ -5329,7 +5754,7 @@
 </p:sld>
 </file>
 
-<file path=ppt/slides/slide8.xml><?xml version="1.0" encoding="utf-8"?>
+<file path=ppt/slides/slide9.xml><?xml version="1.0" encoding="utf-8"?>
 <p:sld xmlns:a="http://schemas.openxmlformats.org/drawingml/2006/main" xmlns:r="http://schemas.openxmlformats.org/officeDocument/2006/relationships" xmlns:p="http://schemas.openxmlformats.org/presentationml/2006/main">
   <p:cSld>
     <p:bg>
@@ -5692,7 +6117,7 @@
             </a:r>
             <a:r>
               <a:rPr lang="en-US" sz="1800" dirty="0"/>
-              <a:t>:</a:t>
+              <a:t>: Karlskrona</a:t>
             </a:r>
           </a:p>
           <a:p>
@@ -6081,7 +6506,7 @@
               <a:rPr lang="en-US" sz="2000" i="1" dirty="0">
                 <a:latin typeface="Bell MT" panose="02020503060305020303" pitchFamily="18" charset="0"/>
               </a:rPr>
-              <a:t> .............., vi </a:t>
+              <a:t> Karlskrona, vi </a:t>
             </a:r>
             <a:r>
               <a:rPr lang="en-US" sz="2000" i="1" dirty="0" err="1">

</xml_diff>

<commit_message>
Uppdaterat PPP och lagt in filter i befolkning
</commit_message>
<xml_diff>
--- a/Unicorn Co.pptx
+++ b/Unicorn Co.pptx
@@ -269,7 +269,7 @@
           <a:p>
             <a:fld id="{2B328789-B4B4-467E-8737-573E270C015E}" type="datetimeFigureOut">
               <a:rPr lang="sv-SE" smtClean="0"/>
-              <a:t>2019-04-03</a:t>
+              <a:t>2019-04-05</a:t>
             </a:fld>
             <a:endParaRPr lang="sv-SE"/>
           </a:p>
@@ -469,7 +469,7 @@
           <a:p>
             <a:fld id="{2B328789-B4B4-467E-8737-573E270C015E}" type="datetimeFigureOut">
               <a:rPr lang="sv-SE" smtClean="0"/>
-              <a:t>2019-04-03</a:t>
+              <a:t>2019-04-05</a:t>
             </a:fld>
             <a:endParaRPr lang="sv-SE"/>
           </a:p>
@@ -679,7 +679,7 @@
           <a:p>
             <a:fld id="{2B328789-B4B4-467E-8737-573E270C015E}" type="datetimeFigureOut">
               <a:rPr lang="sv-SE" smtClean="0"/>
-              <a:t>2019-04-03</a:t>
+              <a:t>2019-04-05</a:t>
             </a:fld>
             <a:endParaRPr lang="sv-SE"/>
           </a:p>
@@ -879,7 +879,7 @@
           <a:p>
             <a:fld id="{2B328789-B4B4-467E-8737-573E270C015E}" type="datetimeFigureOut">
               <a:rPr lang="sv-SE" smtClean="0"/>
-              <a:t>2019-04-03</a:t>
+              <a:t>2019-04-05</a:t>
             </a:fld>
             <a:endParaRPr lang="sv-SE"/>
           </a:p>
@@ -1155,7 +1155,7 @@
           <a:p>
             <a:fld id="{2B328789-B4B4-467E-8737-573E270C015E}" type="datetimeFigureOut">
               <a:rPr lang="sv-SE" smtClean="0"/>
-              <a:t>2019-04-03</a:t>
+              <a:t>2019-04-05</a:t>
             </a:fld>
             <a:endParaRPr lang="sv-SE"/>
           </a:p>
@@ -1423,7 +1423,7 @@
           <a:p>
             <a:fld id="{2B328789-B4B4-467E-8737-573E270C015E}" type="datetimeFigureOut">
               <a:rPr lang="sv-SE" smtClean="0"/>
-              <a:t>2019-04-03</a:t>
+              <a:t>2019-04-05</a:t>
             </a:fld>
             <a:endParaRPr lang="sv-SE"/>
           </a:p>
@@ -1838,7 +1838,7 @@
           <a:p>
             <a:fld id="{2B328789-B4B4-467E-8737-573E270C015E}" type="datetimeFigureOut">
               <a:rPr lang="sv-SE" smtClean="0"/>
-              <a:t>2019-04-03</a:t>
+              <a:t>2019-04-05</a:t>
             </a:fld>
             <a:endParaRPr lang="sv-SE"/>
           </a:p>
@@ -1980,7 +1980,7 @@
           <a:p>
             <a:fld id="{2B328789-B4B4-467E-8737-573E270C015E}" type="datetimeFigureOut">
               <a:rPr lang="sv-SE" smtClean="0"/>
-              <a:t>2019-04-03</a:t>
+              <a:t>2019-04-05</a:t>
             </a:fld>
             <a:endParaRPr lang="sv-SE"/>
           </a:p>
@@ -2093,7 +2093,7 @@
           <a:p>
             <a:fld id="{2B328789-B4B4-467E-8737-573E270C015E}" type="datetimeFigureOut">
               <a:rPr lang="sv-SE" smtClean="0"/>
-              <a:t>2019-04-03</a:t>
+              <a:t>2019-04-05</a:t>
             </a:fld>
             <a:endParaRPr lang="sv-SE"/>
           </a:p>
@@ -2406,7 +2406,7 @@
           <a:p>
             <a:fld id="{2B328789-B4B4-467E-8737-573E270C015E}" type="datetimeFigureOut">
               <a:rPr lang="sv-SE" smtClean="0"/>
-              <a:t>2019-04-03</a:t>
+              <a:t>2019-04-05</a:t>
             </a:fld>
             <a:endParaRPr lang="sv-SE"/>
           </a:p>
@@ -2695,7 +2695,7 @@
           <a:p>
             <a:fld id="{2B328789-B4B4-467E-8737-573E270C015E}" type="datetimeFigureOut">
               <a:rPr lang="sv-SE" smtClean="0"/>
-              <a:t>2019-04-03</a:t>
+              <a:t>2019-04-05</a:t>
             </a:fld>
             <a:endParaRPr lang="sv-SE"/>
           </a:p>
@@ -2938,7 +2938,7 @@
           <a:p>
             <a:fld id="{2B328789-B4B4-467E-8737-573E270C015E}" type="datetimeFigureOut">
               <a:rPr lang="sv-SE" smtClean="0"/>
-              <a:t>2019-04-03</a:t>
+              <a:t>2019-04-05</a:t>
             </a:fld>
             <a:endParaRPr lang="sv-SE"/>
           </a:p>
@@ -4091,6 +4091,12 @@
           <a:p>
             <a:r>
               <a:rPr lang="sv-SE" sz="2400" dirty="0"/>
+              <a:t>Syfte med marknadsanalys</a:t>
+            </a:r>
+          </a:p>
+          <a:p>
+            <a:r>
+              <a:rPr lang="sv-SE" sz="2400" dirty="0"/>
               <a:t>Kravställning</a:t>
             </a:r>
           </a:p>
@@ -4883,19 +4889,6 @@
               <a:rPr lang="sv-SE" sz="2400" dirty="0" err="1"/>
               <a:t>IoT</a:t>
             </a:r>
-            <a:endParaRPr lang="sv-SE" sz="2400" dirty="0"/>
-          </a:p>
-          <a:p>
-            <a:r>
-              <a:rPr lang="sv-SE" sz="2400" dirty="0" err="1"/>
-              <a:t>KPIer</a:t>
-            </a:r>
-            <a:r>
-              <a:rPr lang="sv-SE" sz="2400" dirty="0"/>
-              <a:t>:</a:t>
-            </a:r>
-          </a:p>
-          <a:p>
             <a:endParaRPr lang="sv-SE" sz="2400" dirty="0"/>
           </a:p>
           <a:p>
@@ -6113,16 +6106,6 @@
           <a:p>
             <a:r>
               <a:rPr lang="en-US" sz="1800" dirty="0" err="1"/>
-              <a:t>Stad</a:t>
-            </a:r>
-            <a:r>
-              <a:rPr lang="en-US" sz="1800" dirty="0"/>
-              <a:t>: Karlskrona</a:t>
-            </a:r>
-          </a:p>
-          <a:p>
-            <a:r>
-              <a:rPr lang="en-US" sz="1800" dirty="0" err="1"/>
               <a:t>Kategori</a:t>
             </a:r>
             <a:r>
@@ -6144,6 +6127,16 @@
             <a:r>
               <a:rPr lang="en-US" sz="1800" dirty="0" err="1"/>
               <a:t>Prissättning</a:t>
+            </a:r>
+            <a:r>
+              <a:rPr lang="en-US" sz="1800" dirty="0"/>
+              <a:t>:</a:t>
+            </a:r>
+          </a:p>
+          <a:p>
+            <a:r>
+              <a:rPr lang="en-US" sz="1800" dirty="0" err="1"/>
+              <a:t>Matutbud</a:t>
             </a:r>
             <a:r>
               <a:rPr lang="en-US" sz="1800" dirty="0"/>

</xml_diff>

<commit_message>
Synkat presentation och dokumentation med webbsida
</commit_message>
<xml_diff>
--- a/Unicorn Co.pptx
+++ b/Unicorn Co.pptx
@@ -8,11 +8,11 @@
     <p:sldId id="256" r:id="rId2"/>
     <p:sldId id="257" r:id="rId3"/>
     <p:sldId id="261" r:id="rId4"/>
-    <p:sldId id="258" r:id="rId5"/>
-    <p:sldId id="259" r:id="rId6"/>
-    <p:sldId id="262" r:id="rId7"/>
-    <p:sldId id="265" r:id="rId8"/>
-    <p:sldId id="263" r:id="rId9"/>
+    <p:sldId id="262" r:id="rId5"/>
+    <p:sldId id="265" r:id="rId6"/>
+    <p:sldId id="263" r:id="rId7"/>
+    <p:sldId id="258" r:id="rId8"/>
+    <p:sldId id="259" r:id="rId9"/>
     <p:sldId id="264" r:id="rId10"/>
   </p:sldIdLst>
   <p:sldSz cx="12192000" cy="6858000"/>
@@ -4349,12 +4349,15 @@
             </a:r>
           </a:p>
           <a:p>
+            <a:pPr marL="0" indent="0">
+              <a:buNone/>
+            </a:pPr>
             <a:endParaRPr lang="sv-SE" sz="2000" i="1" dirty="0"/>
           </a:p>
           <a:p>
             <a:r>
               <a:rPr lang="sv-SE" sz="2000" i="1" dirty="0"/>
-              <a:t>Vilken typ av restaurang ska vi öppna baserat på marknadstrender?</a:t>
+              <a:t>Vilken kundgrupper ska vi rikta oss till?</a:t>
             </a:r>
           </a:p>
           <a:p>
@@ -4363,10 +4366,13 @@
           <a:p>
             <a:r>
               <a:rPr lang="sv-SE" sz="2000" i="1" dirty="0"/>
-              <a:t>Vilken/vilka kundgrupper ska vi rikta oss till?</a:t>
-            </a:r>
-          </a:p>
-          <a:p>
+              <a:t>Vilken typ av restaurang ska vi öppna baserat på omsättningsutveckling?</a:t>
+            </a:r>
+          </a:p>
+          <a:p>
+            <a:pPr marL="0" indent="0">
+              <a:buNone/>
+            </a:pPr>
             <a:endParaRPr lang="sv-SE" sz="2000" i="1" dirty="0"/>
           </a:p>
           <a:p>
@@ -4391,525 +4397,6 @@
 </file>
 
 <file path=ppt/slides/slide4.xml><?xml version="1.0" encoding="utf-8"?>
-<p:sld xmlns:a="http://schemas.openxmlformats.org/drawingml/2006/main" xmlns:r="http://schemas.openxmlformats.org/officeDocument/2006/relationships" xmlns:p="http://schemas.openxmlformats.org/presentationml/2006/main">
-  <p:cSld>
-    <p:bg>
-      <p:bgPr>
-        <a:solidFill>
-          <a:schemeClr val="bg1"/>
-        </a:solidFill>
-        <a:effectLst/>
-      </p:bgPr>
-    </p:bg>
-    <p:spTree>
-      <p:nvGrpSpPr>
-        <p:cNvPr id="1" name=""/>
-        <p:cNvGrpSpPr/>
-        <p:nvPr/>
-      </p:nvGrpSpPr>
-      <p:grpSpPr>
-        <a:xfrm>
-          <a:off x="0" y="0"/>
-          <a:ext cx="0" cy="0"/>
-          <a:chOff x="0" y="0"/>
-          <a:chExt cx="0" cy="0"/>
-        </a:xfrm>
-      </p:grpSpPr>
-      <p:sp>
-        <p:nvSpPr>
-          <p:cNvPr id="8" name="Rectangle 7">
-            <a:extLst>
-              <a:ext uri="{FF2B5EF4-FFF2-40B4-BE49-F238E27FC236}">
-                <a16:creationId xmlns:a16="http://schemas.microsoft.com/office/drawing/2014/main" id="{8D70B121-56F4-4848-B38B-182089D909FA}"/>
-              </a:ext>
-              <a:ext uri="{C183D7F6-B498-43B3-948B-1728B52AA6E4}">
-                <adec:decorative xmlns:adec="http://schemas.microsoft.com/office/drawing/2017/decorative" val="1"/>
-              </a:ext>
-            </a:extLst>
-          </p:cNvPr>
-          <p:cNvSpPr>
-            <a:spLocks noGrp="1" noRot="1" noChangeAspect="1" noMove="1" noResize="1" noEditPoints="1" noAdjustHandles="1" noChangeArrowheads="1" noChangeShapeType="1" noTextEdit="1"/>
-          </p:cNvSpPr>
-          <p:nvPr>
-            <p:extLst>
-              <p:ext uri="{386F3935-93C4-4BCD-93E2-E3B085C9AB24}">
-                <p16:designElem xmlns:p16="http://schemas.microsoft.com/office/powerpoint/2015/main" val="1"/>
-              </p:ext>
-            </p:extLst>
-          </p:nvPr>
-        </p:nvSpPr>
-        <p:spPr bwMode="ltGray">
-          <a:xfrm>
-            <a:off x="321564" y="320040"/>
-            <a:ext cx="11548872" cy="6217920"/>
-          </a:xfrm>
-          <a:prstGeom prst="rect">
-            <a:avLst/>
-          </a:prstGeom>
-          <a:solidFill>
-            <a:schemeClr val="tx1">
-              <a:alpha val="8000"/>
-            </a:schemeClr>
-          </a:solidFill>
-          <a:ln w="127000" cap="sq" cmpd="thinThick">
-            <a:noFill/>
-          </a:ln>
-        </p:spPr>
-        <p:style>
-          <a:lnRef idx="2">
-            <a:schemeClr val="accent1">
-              <a:shade val="50000"/>
-            </a:schemeClr>
-          </a:lnRef>
-          <a:fillRef idx="1">
-            <a:schemeClr val="accent1"/>
-          </a:fillRef>
-          <a:effectRef idx="0">
-            <a:schemeClr val="accent1"/>
-          </a:effectRef>
-          <a:fontRef idx="minor">
-            <a:schemeClr val="lt1"/>
-          </a:fontRef>
-        </p:style>
-        <p:txBody>
-          <a:bodyPr rtlCol="0" anchor="ctr"/>
-          <a:lstStyle/>
-          <a:p>
-            <a:pPr algn="ctr"/>
-            <a:endParaRPr lang="en-US"/>
-          </a:p>
-        </p:txBody>
-      </p:sp>
-      <p:sp>
-        <p:nvSpPr>
-          <p:cNvPr id="2" name="Title 1">
-            <a:extLst>
-              <a:ext uri="{FF2B5EF4-FFF2-40B4-BE49-F238E27FC236}">
-                <a16:creationId xmlns:a16="http://schemas.microsoft.com/office/drawing/2014/main" id="{22D9F0F4-95BF-4A77-AA75-826394C8782C}"/>
-              </a:ext>
-            </a:extLst>
-          </p:cNvPr>
-          <p:cNvSpPr>
-            <a:spLocks noGrp="1"/>
-          </p:cNvSpPr>
-          <p:nvPr>
-            <p:ph type="title"/>
-          </p:nvPr>
-        </p:nvSpPr>
-        <p:spPr>
-          <a:xfrm>
-            <a:off x="838200" y="963877"/>
-            <a:ext cx="3494362" cy="4930246"/>
-          </a:xfrm>
-        </p:spPr>
-        <p:txBody>
-          <a:bodyPr>
-            <a:normAutofit/>
-          </a:bodyPr>
-          <a:lstStyle/>
-          <a:p>
-            <a:pPr algn="r"/>
-            <a:r>
-              <a:rPr lang="sv-SE">
-                <a:solidFill>
-                  <a:schemeClr val="accent1"/>
-                </a:solidFill>
-              </a:rPr>
-              <a:t>Svårigheter</a:t>
-            </a:r>
-          </a:p>
-        </p:txBody>
-      </p:sp>
-      <p:cxnSp>
-        <p:nvCxnSpPr>
-          <p:cNvPr id="10" name="Straight Connector 9">
-            <a:extLst>
-              <a:ext uri="{FF2B5EF4-FFF2-40B4-BE49-F238E27FC236}">
-                <a16:creationId xmlns:a16="http://schemas.microsoft.com/office/drawing/2014/main" id="{2D72A2C9-F3CA-4216-8BAD-FA4C970C3C4E}"/>
-              </a:ext>
-              <a:ext uri="{C183D7F6-B498-43B3-948B-1728B52AA6E4}">
-                <adec:decorative xmlns:adec="http://schemas.microsoft.com/office/drawing/2017/decorative" val="1"/>
-              </a:ext>
-            </a:extLst>
-          </p:cNvPr>
-          <p:cNvCxnSpPr>
-            <a:cxnSpLocks noGrp="1" noRot="1" noChangeAspect="1" noMove="1" noResize="1" noEditPoints="1" noAdjustHandles="1" noChangeArrowheads="1" noChangeShapeType="1"/>
-          </p:cNvCxnSpPr>
-          <p:nvPr>
-            <p:extLst>
-              <p:ext uri="{386F3935-93C4-4BCD-93E2-E3B085C9AB24}">
-                <p16:designElem xmlns:p16="http://schemas.microsoft.com/office/powerpoint/2015/main" val="1"/>
-              </p:ext>
-            </p:extLst>
-          </p:nvPr>
-        </p:nvCxnSpPr>
-        <p:spPr>
-          <a:xfrm>
-            <a:off x="4654296" y="2057400"/>
-            <a:ext cx="0" cy="2743200"/>
-          </a:xfrm>
-          <a:prstGeom prst="line">
-            <a:avLst/>
-          </a:prstGeom>
-          <a:ln w="19050">
-            <a:solidFill>
-              <a:schemeClr val="tx1">
-                <a:lumMod val="85000"/>
-                <a:lumOff val="15000"/>
-              </a:schemeClr>
-            </a:solidFill>
-          </a:ln>
-        </p:spPr>
-        <p:style>
-          <a:lnRef idx="1">
-            <a:schemeClr val="accent1"/>
-          </a:lnRef>
-          <a:fillRef idx="0">
-            <a:schemeClr val="accent1"/>
-          </a:fillRef>
-          <a:effectRef idx="0">
-            <a:schemeClr val="accent1"/>
-          </a:effectRef>
-          <a:fontRef idx="minor">
-            <a:schemeClr val="tx1"/>
-          </a:fontRef>
-        </p:style>
-      </p:cxnSp>
-      <p:sp>
-        <p:nvSpPr>
-          <p:cNvPr id="3" name="Content Placeholder 2">
-            <a:extLst>
-              <a:ext uri="{FF2B5EF4-FFF2-40B4-BE49-F238E27FC236}">
-                <a16:creationId xmlns:a16="http://schemas.microsoft.com/office/drawing/2014/main" id="{0E784D22-F89E-4110-B112-26DD1620D946}"/>
-              </a:ext>
-            </a:extLst>
-          </p:cNvPr>
-          <p:cNvSpPr>
-            <a:spLocks noGrp="1"/>
-          </p:cNvSpPr>
-          <p:nvPr>
-            <p:ph idx="1"/>
-          </p:nvPr>
-        </p:nvSpPr>
-        <p:spPr>
-          <a:xfrm>
-            <a:off x="4976031" y="963877"/>
-            <a:ext cx="6377769" cy="4930246"/>
-          </a:xfrm>
-        </p:spPr>
-        <p:txBody>
-          <a:bodyPr anchor="ctr">
-            <a:normAutofit/>
-          </a:bodyPr>
-          <a:lstStyle/>
-          <a:p>
-            <a:r>
-              <a:rPr lang="sv-SE" sz="2400" dirty="0"/>
-              <a:t>Datakällor</a:t>
-            </a:r>
-          </a:p>
-          <a:p>
-            <a:endParaRPr lang="sv-SE" sz="2400" dirty="0"/>
-          </a:p>
-        </p:txBody>
-      </p:sp>
-    </p:spTree>
-    <p:extLst>
-      <p:ext uri="{BB962C8B-B14F-4D97-AF65-F5344CB8AC3E}">
-        <p14:creationId xmlns:p14="http://schemas.microsoft.com/office/powerpoint/2010/main" val="1242908225"/>
-      </p:ext>
-    </p:extLst>
-  </p:cSld>
-  <p:clrMapOvr>
-    <a:masterClrMapping/>
-  </p:clrMapOvr>
-</p:sld>
-</file>
-
-<file path=ppt/slides/slide5.xml><?xml version="1.0" encoding="utf-8"?>
-<p:sld xmlns:a="http://schemas.openxmlformats.org/drawingml/2006/main" xmlns:r="http://schemas.openxmlformats.org/officeDocument/2006/relationships" xmlns:p="http://schemas.openxmlformats.org/presentationml/2006/main">
-  <p:cSld>
-    <p:bg>
-      <p:bgPr>
-        <a:solidFill>
-          <a:schemeClr val="bg1"/>
-        </a:solidFill>
-        <a:effectLst/>
-      </p:bgPr>
-    </p:bg>
-    <p:spTree>
-      <p:nvGrpSpPr>
-        <p:cNvPr id="1" name=""/>
-        <p:cNvGrpSpPr/>
-        <p:nvPr/>
-      </p:nvGrpSpPr>
-      <p:grpSpPr>
-        <a:xfrm>
-          <a:off x="0" y="0"/>
-          <a:ext cx="0" cy="0"/>
-          <a:chOff x="0" y="0"/>
-          <a:chExt cx="0" cy="0"/>
-        </a:xfrm>
-      </p:grpSpPr>
-      <p:sp>
-        <p:nvSpPr>
-          <p:cNvPr id="11" name="Rectangle 7">
-            <a:extLst>
-              <a:ext uri="{FF2B5EF4-FFF2-40B4-BE49-F238E27FC236}">
-                <a16:creationId xmlns:a16="http://schemas.microsoft.com/office/drawing/2014/main" id="{8D70B121-56F4-4848-B38B-182089D909FA}"/>
-              </a:ext>
-              <a:ext uri="{C183D7F6-B498-43B3-948B-1728B52AA6E4}">
-                <adec:decorative xmlns:adec="http://schemas.microsoft.com/office/drawing/2017/decorative" val="1"/>
-              </a:ext>
-            </a:extLst>
-          </p:cNvPr>
-          <p:cNvSpPr>
-            <a:spLocks noGrp="1" noRot="1" noChangeAspect="1" noMove="1" noResize="1" noEditPoints="1" noAdjustHandles="1" noChangeArrowheads="1" noChangeShapeType="1" noTextEdit="1"/>
-          </p:cNvSpPr>
-          <p:nvPr>
-            <p:extLst>
-              <p:ext uri="{386F3935-93C4-4BCD-93E2-E3B085C9AB24}">
-                <p16:designElem xmlns:p16="http://schemas.microsoft.com/office/powerpoint/2015/main" val="1"/>
-              </p:ext>
-            </p:extLst>
-          </p:nvPr>
-        </p:nvSpPr>
-        <p:spPr bwMode="ltGray">
-          <a:xfrm>
-            <a:off x="321564" y="320040"/>
-            <a:ext cx="11548872" cy="6217920"/>
-          </a:xfrm>
-          <a:prstGeom prst="rect">
-            <a:avLst/>
-          </a:prstGeom>
-          <a:solidFill>
-            <a:schemeClr val="tx1">
-              <a:alpha val="8000"/>
-            </a:schemeClr>
-          </a:solidFill>
-          <a:ln w="127000" cap="sq" cmpd="thinThick">
-            <a:noFill/>
-          </a:ln>
-        </p:spPr>
-        <p:style>
-          <a:lnRef idx="2">
-            <a:schemeClr val="accent1">
-              <a:shade val="50000"/>
-            </a:schemeClr>
-          </a:lnRef>
-          <a:fillRef idx="1">
-            <a:schemeClr val="accent1"/>
-          </a:fillRef>
-          <a:effectRef idx="0">
-            <a:schemeClr val="accent1"/>
-          </a:effectRef>
-          <a:fontRef idx="minor">
-            <a:schemeClr val="lt1"/>
-          </a:fontRef>
-        </p:style>
-        <p:txBody>
-          <a:bodyPr rtlCol="0" anchor="ctr"/>
-          <a:lstStyle/>
-          <a:p>
-            <a:pPr algn="ctr"/>
-            <a:endParaRPr lang="en-US"/>
-          </a:p>
-        </p:txBody>
-      </p:sp>
-      <p:sp>
-        <p:nvSpPr>
-          <p:cNvPr id="2" name="Title 1">
-            <a:extLst>
-              <a:ext uri="{FF2B5EF4-FFF2-40B4-BE49-F238E27FC236}">
-                <a16:creationId xmlns:a16="http://schemas.microsoft.com/office/drawing/2014/main" id="{AD9A6052-7C9E-418A-B2E4-48E64978F3ED}"/>
-              </a:ext>
-            </a:extLst>
-          </p:cNvPr>
-          <p:cNvSpPr>
-            <a:spLocks noGrp="1"/>
-          </p:cNvSpPr>
-          <p:nvPr>
-            <p:ph type="title"/>
-          </p:nvPr>
-        </p:nvSpPr>
-        <p:spPr>
-          <a:xfrm>
-            <a:off x="838200" y="963877"/>
-            <a:ext cx="3494362" cy="4930246"/>
-          </a:xfrm>
-        </p:spPr>
-        <p:txBody>
-          <a:bodyPr>
-            <a:normAutofit/>
-          </a:bodyPr>
-          <a:lstStyle/>
-          <a:p>
-            <a:pPr algn="r"/>
-            <a:r>
-              <a:rPr lang="sv-SE" dirty="0">
-                <a:solidFill>
-                  <a:schemeClr val="accent1"/>
-                </a:solidFill>
-              </a:rPr>
-              <a:t>Möjligheter</a:t>
-            </a:r>
-          </a:p>
-        </p:txBody>
-      </p:sp>
-      <p:cxnSp>
-        <p:nvCxnSpPr>
-          <p:cNvPr id="10" name="Straight Connector 9">
-            <a:extLst>
-              <a:ext uri="{FF2B5EF4-FFF2-40B4-BE49-F238E27FC236}">
-                <a16:creationId xmlns:a16="http://schemas.microsoft.com/office/drawing/2014/main" id="{2D72A2C9-F3CA-4216-8BAD-FA4C970C3C4E}"/>
-              </a:ext>
-              <a:ext uri="{C183D7F6-B498-43B3-948B-1728B52AA6E4}">
-                <adec:decorative xmlns:adec="http://schemas.microsoft.com/office/drawing/2017/decorative" val="1"/>
-              </a:ext>
-            </a:extLst>
-          </p:cNvPr>
-          <p:cNvCxnSpPr>
-            <a:cxnSpLocks noGrp="1" noRot="1" noChangeAspect="1" noMove="1" noResize="1" noEditPoints="1" noAdjustHandles="1" noChangeArrowheads="1" noChangeShapeType="1"/>
-          </p:cNvCxnSpPr>
-          <p:nvPr>
-            <p:extLst>
-              <p:ext uri="{386F3935-93C4-4BCD-93E2-E3B085C9AB24}">
-                <p16:designElem xmlns:p16="http://schemas.microsoft.com/office/powerpoint/2015/main" val="1"/>
-              </p:ext>
-            </p:extLst>
-          </p:nvPr>
-        </p:nvCxnSpPr>
-        <p:spPr>
-          <a:xfrm>
-            <a:off x="4654296" y="2057400"/>
-            <a:ext cx="0" cy="2743200"/>
-          </a:xfrm>
-          <a:prstGeom prst="line">
-            <a:avLst/>
-          </a:prstGeom>
-          <a:ln w="19050">
-            <a:solidFill>
-              <a:schemeClr val="tx1">
-                <a:lumMod val="85000"/>
-                <a:lumOff val="15000"/>
-              </a:schemeClr>
-            </a:solidFill>
-          </a:ln>
-        </p:spPr>
-        <p:style>
-          <a:lnRef idx="1">
-            <a:schemeClr val="accent1"/>
-          </a:lnRef>
-          <a:fillRef idx="0">
-            <a:schemeClr val="accent1"/>
-          </a:fillRef>
-          <a:effectRef idx="0">
-            <a:schemeClr val="accent1"/>
-          </a:effectRef>
-          <a:fontRef idx="minor">
-            <a:schemeClr val="tx1"/>
-          </a:fontRef>
-        </p:style>
-      </p:cxnSp>
-      <p:sp>
-        <p:nvSpPr>
-          <p:cNvPr id="3" name="Content Placeholder 2">
-            <a:extLst>
-              <a:ext uri="{FF2B5EF4-FFF2-40B4-BE49-F238E27FC236}">
-                <a16:creationId xmlns:a16="http://schemas.microsoft.com/office/drawing/2014/main" id="{A1B7DF31-A508-4E95-9AC9-C7265F6DB0B5}"/>
-              </a:ext>
-            </a:extLst>
-          </p:cNvPr>
-          <p:cNvSpPr>
-            <a:spLocks noGrp="1"/>
-          </p:cNvSpPr>
-          <p:nvPr>
-            <p:ph idx="1"/>
-          </p:nvPr>
-        </p:nvSpPr>
-        <p:spPr>
-          <a:xfrm>
-            <a:off x="4976031" y="963877"/>
-            <a:ext cx="6377769" cy="4930246"/>
-          </a:xfrm>
-        </p:spPr>
-        <p:txBody>
-          <a:bodyPr anchor="ctr">
-            <a:normAutofit/>
-          </a:bodyPr>
-          <a:lstStyle/>
-          <a:p>
-            <a:r>
-              <a:rPr lang="sv-SE" sz="2400" dirty="0"/>
-              <a:t>Generiska maträtter</a:t>
-            </a:r>
-          </a:p>
-          <a:p>
-            <a:r>
-              <a:rPr lang="sv-SE" sz="2400" dirty="0"/>
-              <a:t>Optimerad prissättning</a:t>
-            </a:r>
-          </a:p>
-          <a:p>
-            <a:r>
-              <a:rPr lang="sv-SE" sz="2400" dirty="0"/>
-              <a:t>Kundnöjdhet</a:t>
-            </a:r>
-          </a:p>
-          <a:p>
-            <a:r>
-              <a:rPr lang="sv-SE" sz="2400" dirty="0"/>
-              <a:t>Personalplacering</a:t>
-            </a:r>
-          </a:p>
-          <a:p>
-            <a:r>
-              <a:rPr lang="sv-SE" sz="2400" dirty="0"/>
-              <a:t>Nettointäkter</a:t>
-            </a:r>
-          </a:p>
-          <a:p>
-            <a:r>
-              <a:rPr lang="sv-SE" sz="2400" dirty="0"/>
-              <a:t>Inköpsplanering</a:t>
-            </a:r>
-          </a:p>
-          <a:p>
-            <a:r>
-              <a:rPr lang="sv-SE" sz="2400" dirty="0" err="1"/>
-              <a:t>Dashboard</a:t>
-            </a:r>
-            <a:r>
-              <a:rPr lang="sv-SE" sz="2400" dirty="0"/>
-              <a:t> till köket</a:t>
-            </a:r>
-          </a:p>
-          <a:p>
-            <a:r>
-              <a:rPr lang="sv-SE" sz="2400" dirty="0" err="1"/>
-              <a:t>IoT</a:t>
-            </a:r>
-            <a:endParaRPr lang="sv-SE" sz="2400" dirty="0"/>
-          </a:p>
-          <a:p>
-            <a:endParaRPr lang="sv-SE" sz="2400" dirty="0"/>
-          </a:p>
-        </p:txBody>
-      </p:sp>
-    </p:spTree>
-    <p:extLst>
-      <p:ext uri="{BB962C8B-B14F-4D97-AF65-F5344CB8AC3E}">
-        <p14:creationId xmlns:p14="http://schemas.microsoft.com/office/powerpoint/2010/main" val="4013518900"/>
-      </p:ext>
-    </p:extLst>
-  </p:cSld>
-  <p:clrMapOvr>
-    <a:masterClrMapping/>
-  </p:clrMapOvr>
-</p:sld>
-</file>
-
-<file path=ppt/slides/slide6.xml><?xml version="1.0" encoding="utf-8"?>
 <p:sld xmlns:a="http://schemas.openxmlformats.org/drawingml/2006/main" xmlns:r="http://schemas.openxmlformats.org/officeDocument/2006/relationships" xmlns:p="http://schemas.openxmlformats.org/presentationml/2006/main">
   <p:cSld>
     <p:bg>
@@ -5126,7 +4613,7 @@
 </p:sld>
 </file>
 
-<file path=ppt/slides/slide7.xml><?xml version="1.0" encoding="utf-8"?>
+<file path=ppt/slides/slide5.xml><?xml version="1.0" encoding="utf-8"?>
 <p:sld xmlns:a="http://schemas.openxmlformats.org/drawingml/2006/main" xmlns:r="http://schemas.openxmlformats.org/officeDocument/2006/relationships" xmlns:p="http://schemas.openxmlformats.org/presentationml/2006/main">
   <p:cSld>
     <p:bg>
@@ -5537,6 +5024,88 @@
           </a:fontRef>
         </p:style>
       </p:cxnSp>
+      <p:sp>
+        <p:nvSpPr>
+          <p:cNvPr id="12" name="Title 1">
+            <a:extLst>
+              <a:ext uri="{FF2B5EF4-FFF2-40B4-BE49-F238E27FC236}">
+                <a16:creationId xmlns:a16="http://schemas.microsoft.com/office/drawing/2014/main" id="{9D844A4F-2978-4074-A890-DA66BE9B30D3}"/>
+              </a:ext>
+            </a:extLst>
+          </p:cNvPr>
+          <p:cNvSpPr txBox="1">
+            <a:spLocks/>
+          </p:cNvSpPr>
+          <p:nvPr/>
+        </p:nvSpPr>
+        <p:spPr>
+          <a:xfrm>
+            <a:off x="9209987" y="708846"/>
+            <a:ext cx="2272558" cy="1845210"/>
+          </a:xfrm>
+          <a:prstGeom prst="rect">
+            <a:avLst/>
+          </a:prstGeom>
+          <a:solidFill>
+            <a:schemeClr val="accent1"/>
+          </a:solidFill>
+          <a:ln w="174625" cmpd="thinThick">
+            <a:solidFill>
+              <a:schemeClr val="accent1"/>
+            </a:solidFill>
+          </a:ln>
+        </p:spPr>
+        <p:txBody>
+          <a:bodyPr vert="horz" lIns="91440" tIns="45720" rIns="91440" bIns="45720" rtlCol="0" anchor="ctr">
+            <a:normAutofit/>
+          </a:bodyPr>
+          <a:lstStyle>
+            <a:lvl1pPr algn="l" defTabSz="914400" rtl="0" eaLnBrk="1" latinLnBrk="0" hangingPunct="1">
+              <a:lnSpc>
+                <a:spcPct val="90000"/>
+              </a:lnSpc>
+              <a:spcBef>
+                <a:spcPct val="0"/>
+              </a:spcBef>
+              <a:buNone/>
+              <a:defRPr sz="4400" kern="1200">
+                <a:solidFill>
+                  <a:schemeClr val="tx1"/>
+                </a:solidFill>
+                <a:latin typeface="+mj-lt"/>
+                <a:ea typeface="+mj-ea"/>
+                <a:cs typeface="+mj-cs"/>
+              </a:defRPr>
+            </a:lvl1pPr>
+          </a:lstStyle>
+          <a:p>
+            <a:pPr algn="ctr"/>
+            <a:r>
+              <a:rPr lang="en-US" sz="2800" dirty="0">
+                <a:solidFill>
+                  <a:srgbClr val="FFFFFF"/>
+                </a:solidFill>
+              </a:rPr>
+              <a:t>ETL</a:t>
+            </a:r>
+            <a:br>
+              <a:rPr lang="en-US" sz="2800" dirty="0">
+                <a:solidFill>
+                  <a:srgbClr val="FFFFFF"/>
+                </a:solidFill>
+              </a:rPr>
+            </a:br>
+            <a:r>
+              <a:rPr lang="en-US" sz="2800" dirty="0">
+                <a:solidFill>
+                  <a:srgbClr val="FFFFFF"/>
+                </a:solidFill>
+              </a:rPr>
+              <a:t>via SQL Server</a:t>
+            </a:r>
+          </a:p>
+        </p:txBody>
+      </p:sp>
     </p:spTree>
     <p:extLst>
       <p:ext uri="{BB962C8B-B14F-4D97-AF65-F5344CB8AC3E}">
@@ -5550,7 +5119,7 @@
 </p:sld>
 </file>
 
-<file path=ppt/slides/slide8.xml><?xml version="1.0" encoding="utf-8"?>
+<file path=ppt/slides/slide6.xml><?xml version="1.0" encoding="utf-8"?>
 <p:sld xmlns:a="http://schemas.openxmlformats.org/drawingml/2006/main" xmlns:r="http://schemas.openxmlformats.org/officeDocument/2006/relationships" xmlns:p="http://schemas.openxmlformats.org/presentationml/2006/main">
   <p:cSld>
     <p:bg>
@@ -5738,6 +5307,531 @@
     <p:extLst>
       <p:ext uri="{BB962C8B-B14F-4D97-AF65-F5344CB8AC3E}">
         <p14:creationId xmlns:p14="http://schemas.microsoft.com/office/powerpoint/2010/main" val="1434654657"/>
+      </p:ext>
+    </p:extLst>
+  </p:cSld>
+  <p:clrMapOvr>
+    <a:masterClrMapping/>
+  </p:clrMapOvr>
+</p:sld>
+</file>
+
+<file path=ppt/slides/slide7.xml><?xml version="1.0" encoding="utf-8"?>
+<p:sld xmlns:a="http://schemas.openxmlformats.org/drawingml/2006/main" xmlns:r="http://schemas.openxmlformats.org/officeDocument/2006/relationships" xmlns:p="http://schemas.openxmlformats.org/presentationml/2006/main">
+  <p:cSld>
+    <p:bg>
+      <p:bgPr>
+        <a:solidFill>
+          <a:schemeClr val="bg1"/>
+        </a:solidFill>
+        <a:effectLst/>
+      </p:bgPr>
+    </p:bg>
+    <p:spTree>
+      <p:nvGrpSpPr>
+        <p:cNvPr id="1" name=""/>
+        <p:cNvGrpSpPr/>
+        <p:nvPr/>
+      </p:nvGrpSpPr>
+      <p:grpSpPr>
+        <a:xfrm>
+          <a:off x="0" y="0"/>
+          <a:ext cx="0" cy="0"/>
+          <a:chOff x="0" y="0"/>
+          <a:chExt cx="0" cy="0"/>
+        </a:xfrm>
+      </p:grpSpPr>
+      <p:sp>
+        <p:nvSpPr>
+          <p:cNvPr id="8" name="Rectangle 7">
+            <a:extLst>
+              <a:ext uri="{FF2B5EF4-FFF2-40B4-BE49-F238E27FC236}">
+                <a16:creationId xmlns:a16="http://schemas.microsoft.com/office/drawing/2014/main" id="{8D70B121-56F4-4848-B38B-182089D909FA}"/>
+              </a:ext>
+              <a:ext uri="{C183D7F6-B498-43B3-948B-1728B52AA6E4}">
+                <adec:decorative xmlns:adec="http://schemas.microsoft.com/office/drawing/2017/decorative" val="1"/>
+              </a:ext>
+            </a:extLst>
+          </p:cNvPr>
+          <p:cNvSpPr>
+            <a:spLocks noGrp="1" noRot="1" noChangeAspect="1" noMove="1" noResize="1" noEditPoints="1" noAdjustHandles="1" noChangeArrowheads="1" noChangeShapeType="1" noTextEdit="1"/>
+          </p:cNvSpPr>
+          <p:nvPr>
+            <p:extLst>
+              <p:ext uri="{386F3935-93C4-4BCD-93E2-E3B085C9AB24}">
+                <p16:designElem xmlns:p16="http://schemas.microsoft.com/office/powerpoint/2015/main" val="1"/>
+              </p:ext>
+            </p:extLst>
+          </p:nvPr>
+        </p:nvSpPr>
+        <p:spPr bwMode="ltGray">
+          <a:xfrm>
+            <a:off x="321564" y="320040"/>
+            <a:ext cx="11548872" cy="6217920"/>
+          </a:xfrm>
+          <a:prstGeom prst="rect">
+            <a:avLst/>
+          </a:prstGeom>
+          <a:solidFill>
+            <a:schemeClr val="tx1">
+              <a:alpha val="8000"/>
+            </a:schemeClr>
+          </a:solidFill>
+          <a:ln w="127000" cap="sq" cmpd="thinThick">
+            <a:noFill/>
+          </a:ln>
+        </p:spPr>
+        <p:style>
+          <a:lnRef idx="2">
+            <a:schemeClr val="accent1">
+              <a:shade val="50000"/>
+            </a:schemeClr>
+          </a:lnRef>
+          <a:fillRef idx="1">
+            <a:schemeClr val="accent1"/>
+          </a:fillRef>
+          <a:effectRef idx="0">
+            <a:schemeClr val="accent1"/>
+          </a:effectRef>
+          <a:fontRef idx="minor">
+            <a:schemeClr val="lt1"/>
+          </a:fontRef>
+        </p:style>
+        <p:txBody>
+          <a:bodyPr rtlCol="0" anchor="ctr"/>
+          <a:lstStyle/>
+          <a:p>
+            <a:pPr algn="ctr"/>
+            <a:endParaRPr lang="en-US"/>
+          </a:p>
+        </p:txBody>
+      </p:sp>
+      <p:sp>
+        <p:nvSpPr>
+          <p:cNvPr id="2" name="Title 1">
+            <a:extLst>
+              <a:ext uri="{FF2B5EF4-FFF2-40B4-BE49-F238E27FC236}">
+                <a16:creationId xmlns:a16="http://schemas.microsoft.com/office/drawing/2014/main" id="{22D9F0F4-95BF-4A77-AA75-826394C8782C}"/>
+              </a:ext>
+            </a:extLst>
+          </p:cNvPr>
+          <p:cNvSpPr>
+            <a:spLocks noGrp="1"/>
+          </p:cNvSpPr>
+          <p:nvPr>
+            <p:ph type="title"/>
+          </p:nvPr>
+        </p:nvSpPr>
+        <p:spPr>
+          <a:xfrm>
+            <a:off x="838200" y="963877"/>
+            <a:ext cx="3494362" cy="4930246"/>
+          </a:xfrm>
+        </p:spPr>
+        <p:txBody>
+          <a:bodyPr>
+            <a:normAutofit/>
+          </a:bodyPr>
+          <a:lstStyle/>
+          <a:p>
+            <a:pPr algn="r"/>
+            <a:r>
+              <a:rPr lang="sv-SE">
+                <a:solidFill>
+                  <a:schemeClr val="accent1"/>
+                </a:solidFill>
+              </a:rPr>
+              <a:t>Svårigheter</a:t>
+            </a:r>
+          </a:p>
+        </p:txBody>
+      </p:sp>
+      <p:cxnSp>
+        <p:nvCxnSpPr>
+          <p:cNvPr id="10" name="Straight Connector 9">
+            <a:extLst>
+              <a:ext uri="{FF2B5EF4-FFF2-40B4-BE49-F238E27FC236}">
+                <a16:creationId xmlns:a16="http://schemas.microsoft.com/office/drawing/2014/main" id="{2D72A2C9-F3CA-4216-8BAD-FA4C970C3C4E}"/>
+              </a:ext>
+              <a:ext uri="{C183D7F6-B498-43B3-948B-1728B52AA6E4}">
+                <adec:decorative xmlns:adec="http://schemas.microsoft.com/office/drawing/2017/decorative" val="1"/>
+              </a:ext>
+            </a:extLst>
+          </p:cNvPr>
+          <p:cNvCxnSpPr>
+            <a:cxnSpLocks noGrp="1" noRot="1" noChangeAspect="1" noMove="1" noResize="1" noEditPoints="1" noAdjustHandles="1" noChangeArrowheads="1" noChangeShapeType="1"/>
+          </p:cNvCxnSpPr>
+          <p:nvPr>
+            <p:extLst>
+              <p:ext uri="{386F3935-93C4-4BCD-93E2-E3B085C9AB24}">
+                <p16:designElem xmlns:p16="http://schemas.microsoft.com/office/powerpoint/2015/main" val="1"/>
+              </p:ext>
+            </p:extLst>
+          </p:nvPr>
+        </p:nvCxnSpPr>
+        <p:spPr>
+          <a:xfrm>
+            <a:off x="4654296" y="2057400"/>
+            <a:ext cx="0" cy="2743200"/>
+          </a:xfrm>
+          <a:prstGeom prst="line">
+            <a:avLst/>
+          </a:prstGeom>
+          <a:ln w="19050">
+            <a:solidFill>
+              <a:schemeClr val="tx1">
+                <a:lumMod val="85000"/>
+                <a:lumOff val="15000"/>
+              </a:schemeClr>
+            </a:solidFill>
+          </a:ln>
+        </p:spPr>
+        <p:style>
+          <a:lnRef idx="1">
+            <a:schemeClr val="accent1"/>
+          </a:lnRef>
+          <a:fillRef idx="0">
+            <a:schemeClr val="accent1"/>
+          </a:fillRef>
+          <a:effectRef idx="0">
+            <a:schemeClr val="accent1"/>
+          </a:effectRef>
+          <a:fontRef idx="minor">
+            <a:schemeClr val="tx1"/>
+          </a:fontRef>
+        </p:style>
+      </p:cxnSp>
+      <p:sp>
+        <p:nvSpPr>
+          <p:cNvPr id="3" name="Content Placeholder 2">
+            <a:extLst>
+              <a:ext uri="{FF2B5EF4-FFF2-40B4-BE49-F238E27FC236}">
+                <a16:creationId xmlns:a16="http://schemas.microsoft.com/office/drawing/2014/main" id="{0E784D22-F89E-4110-B112-26DD1620D946}"/>
+              </a:ext>
+            </a:extLst>
+          </p:cNvPr>
+          <p:cNvSpPr>
+            <a:spLocks noGrp="1"/>
+          </p:cNvSpPr>
+          <p:nvPr>
+            <p:ph idx="1"/>
+          </p:nvPr>
+        </p:nvSpPr>
+        <p:spPr>
+          <a:xfrm>
+            <a:off x="4976031" y="963877"/>
+            <a:ext cx="6377769" cy="4930246"/>
+          </a:xfrm>
+        </p:spPr>
+        <p:txBody>
+          <a:bodyPr anchor="ctr">
+            <a:normAutofit/>
+          </a:bodyPr>
+          <a:lstStyle/>
+          <a:p>
+            <a:r>
+              <a:rPr lang="sv-SE" sz="2400" dirty="0"/>
+              <a:t>Datakällor för restauranger</a:t>
+            </a:r>
+          </a:p>
+          <a:p>
+            <a:r>
+              <a:rPr lang="sv-SE" sz="2400" dirty="0"/>
+              <a:t>SQL server</a:t>
+            </a:r>
+          </a:p>
+          <a:p>
+            <a:endParaRPr lang="sv-SE" sz="2400" dirty="0"/>
+          </a:p>
+        </p:txBody>
+      </p:sp>
+    </p:spTree>
+    <p:extLst>
+      <p:ext uri="{BB962C8B-B14F-4D97-AF65-F5344CB8AC3E}">
+        <p14:creationId xmlns:p14="http://schemas.microsoft.com/office/powerpoint/2010/main" val="1242908225"/>
+      </p:ext>
+    </p:extLst>
+  </p:cSld>
+  <p:clrMapOvr>
+    <a:masterClrMapping/>
+  </p:clrMapOvr>
+</p:sld>
+</file>
+
+<file path=ppt/slides/slide8.xml><?xml version="1.0" encoding="utf-8"?>
+<p:sld xmlns:a="http://schemas.openxmlformats.org/drawingml/2006/main" xmlns:r="http://schemas.openxmlformats.org/officeDocument/2006/relationships" xmlns:p="http://schemas.openxmlformats.org/presentationml/2006/main">
+  <p:cSld>
+    <p:bg>
+      <p:bgPr>
+        <a:solidFill>
+          <a:schemeClr val="bg1"/>
+        </a:solidFill>
+        <a:effectLst/>
+      </p:bgPr>
+    </p:bg>
+    <p:spTree>
+      <p:nvGrpSpPr>
+        <p:cNvPr id="1" name=""/>
+        <p:cNvGrpSpPr/>
+        <p:nvPr/>
+      </p:nvGrpSpPr>
+      <p:grpSpPr>
+        <a:xfrm>
+          <a:off x="0" y="0"/>
+          <a:ext cx="0" cy="0"/>
+          <a:chOff x="0" y="0"/>
+          <a:chExt cx="0" cy="0"/>
+        </a:xfrm>
+      </p:grpSpPr>
+      <p:sp>
+        <p:nvSpPr>
+          <p:cNvPr id="11" name="Rectangle 7">
+            <a:extLst>
+              <a:ext uri="{FF2B5EF4-FFF2-40B4-BE49-F238E27FC236}">
+                <a16:creationId xmlns:a16="http://schemas.microsoft.com/office/drawing/2014/main" id="{8D70B121-56F4-4848-B38B-182089D909FA}"/>
+              </a:ext>
+              <a:ext uri="{C183D7F6-B498-43B3-948B-1728B52AA6E4}">
+                <adec:decorative xmlns:adec="http://schemas.microsoft.com/office/drawing/2017/decorative" val="1"/>
+              </a:ext>
+            </a:extLst>
+          </p:cNvPr>
+          <p:cNvSpPr>
+            <a:spLocks noGrp="1" noRot="1" noChangeAspect="1" noMove="1" noResize="1" noEditPoints="1" noAdjustHandles="1" noChangeArrowheads="1" noChangeShapeType="1" noTextEdit="1"/>
+          </p:cNvSpPr>
+          <p:nvPr>
+            <p:extLst>
+              <p:ext uri="{386F3935-93C4-4BCD-93E2-E3B085C9AB24}">
+                <p16:designElem xmlns:p16="http://schemas.microsoft.com/office/powerpoint/2015/main" val="1"/>
+              </p:ext>
+            </p:extLst>
+          </p:nvPr>
+        </p:nvSpPr>
+        <p:spPr bwMode="ltGray">
+          <a:xfrm>
+            <a:off x="321564" y="320040"/>
+            <a:ext cx="11548872" cy="6217920"/>
+          </a:xfrm>
+          <a:prstGeom prst="rect">
+            <a:avLst/>
+          </a:prstGeom>
+          <a:solidFill>
+            <a:schemeClr val="tx1">
+              <a:alpha val="8000"/>
+            </a:schemeClr>
+          </a:solidFill>
+          <a:ln w="127000" cap="sq" cmpd="thinThick">
+            <a:noFill/>
+          </a:ln>
+        </p:spPr>
+        <p:style>
+          <a:lnRef idx="2">
+            <a:schemeClr val="accent1">
+              <a:shade val="50000"/>
+            </a:schemeClr>
+          </a:lnRef>
+          <a:fillRef idx="1">
+            <a:schemeClr val="accent1"/>
+          </a:fillRef>
+          <a:effectRef idx="0">
+            <a:schemeClr val="accent1"/>
+          </a:effectRef>
+          <a:fontRef idx="minor">
+            <a:schemeClr val="lt1"/>
+          </a:fontRef>
+        </p:style>
+        <p:txBody>
+          <a:bodyPr rtlCol="0" anchor="ctr"/>
+          <a:lstStyle/>
+          <a:p>
+            <a:pPr algn="ctr"/>
+            <a:endParaRPr lang="en-US"/>
+          </a:p>
+        </p:txBody>
+      </p:sp>
+      <p:sp>
+        <p:nvSpPr>
+          <p:cNvPr id="2" name="Title 1">
+            <a:extLst>
+              <a:ext uri="{FF2B5EF4-FFF2-40B4-BE49-F238E27FC236}">
+                <a16:creationId xmlns:a16="http://schemas.microsoft.com/office/drawing/2014/main" id="{AD9A6052-7C9E-418A-B2E4-48E64978F3ED}"/>
+              </a:ext>
+            </a:extLst>
+          </p:cNvPr>
+          <p:cNvSpPr>
+            <a:spLocks noGrp="1"/>
+          </p:cNvSpPr>
+          <p:nvPr>
+            <p:ph type="title"/>
+          </p:nvPr>
+        </p:nvSpPr>
+        <p:spPr>
+          <a:xfrm>
+            <a:off x="838200" y="963877"/>
+            <a:ext cx="3494362" cy="4930246"/>
+          </a:xfrm>
+        </p:spPr>
+        <p:txBody>
+          <a:bodyPr>
+            <a:normAutofit/>
+          </a:bodyPr>
+          <a:lstStyle/>
+          <a:p>
+            <a:pPr algn="r"/>
+            <a:r>
+              <a:rPr lang="sv-SE" dirty="0">
+                <a:solidFill>
+                  <a:schemeClr val="accent1"/>
+                </a:solidFill>
+              </a:rPr>
+              <a:t>Möjligheter</a:t>
+            </a:r>
+          </a:p>
+        </p:txBody>
+      </p:sp>
+      <p:cxnSp>
+        <p:nvCxnSpPr>
+          <p:cNvPr id="10" name="Straight Connector 9">
+            <a:extLst>
+              <a:ext uri="{FF2B5EF4-FFF2-40B4-BE49-F238E27FC236}">
+                <a16:creationId xmlns:a16="http://schemas.microsoft.com/office/drawing/2014/main" id="{2D72A2C9-F3CA-4216-8BAD-FA4C970C3C4E}"/>
+              </a:ext>
+              <a:ext uri="{C183D7F6-B498-43B3-948B-1728B52AA6E4}">
+                <adec:decorative xmlns:adec="http://schemas.microsoft.com/office/drawing/2017/decorative" val="1"/>
+              </a:ext>
+            </a:extLst>
+          </p:cNvPr>
+          <p:cNvCxnSpPr>
+            <a:cxnSpLocks noGrp="1" noRot="1" noChangeAspect="1" noMove="1" noResize="1" noEditPoints="1" noAdjustHandles="1" noChangeArrowheads="1" noChangeShapeType="1"/>
+          </p:cNvCxnSpPr>
+          <p:nvPr>
+            <p:extLst>
+              <p:ext uri="{386F3935-93C4-4BCD-93E2-E3B085C9AB24}">
+                <p16:designElem xmlns:p16="http://schemas.microsoft.com/office/powerpoint/2015/main" val="1"/>
+              </p:ext>
+            </p:extLst>
+          </p:nvPr>
+        </p:nvCxnSpPr>
+        <p:spPr>
+          <a:xfrm>
+            <a:off x="4654296" y="2057400"/>
+            <a:ext cx="0" cy="2743200"/>
+          </a:xfrm>
+          <a:prstGeom prst="line">
+            <a:avLst/>
+          </a:prstGeom>
+          <a:ln w="19050">
+            <a:solidFill>
+              <a:schemeClr val="tx1">
+                <a:lumMod val="85000"/>
+                <a:lumOff val="15000"/>
+              </a:schemeClr>
+            </a:solidFill>
+          </a:ln>
+        </p:spPr>
+        <p:style>
+          <a:lnRef idx="1">
+            <a:schemeClr val="accent1"/>
+          </a:lnRef>
+          <a:fillRef idx="0">
+            <a:schemeClr val="accent1"/>
+          </a:fillRef>
+          <a:effectRef idx="0">
+            <a:schemeClr val="accent1"/>
+          </a:effectRef>
+          <a:fontRef idx="minor">
+            <a:schemeClr val="tx1"/>
+          </a:fontRef>
+        </p:style>
+      </p:cxnSp>
+      <p:sp>
+        <p:nvSpPr>
+          <p:cNvPr id="3" name="Content Placeholder 2">
+            <a:extLst>
+              <a:ext uri="{FF2B5EF4-FFF2-40B4-BE49-F238E27FC236}">
+                <a16:creationId xmlns:a16="http://schemas.microsoft.com/office/drawing/2014/main" id="{A1B7DF31-A508-4E95-9AC9-C7265F6DB0B5}"/>
+              </a:ext>
+            </a:extLst>
+          </p:cNvPr>
+          <p:cNvSpPr>
+            <a:spLocks noGrp="1"/>
+          </p:cNvSpPr>
+          <p:nvPr>
+            <p:ph idx="1"/>
+          </p:nvPr>
+        </p:nvSpPr>
+        <p:spPr>
+          <a:xfrm>
+            <a:off x="4976031" y="963877"/>
+            <a:ext cx="6377769" cy="4930246"/>
+          </a:xfrm>
+        </p:spPr>
+        <p:txBody>
+          <a:bodyPr anchor="ctr">
+            <a:normAutofit/>
+          </a:bodyPr>
+          <a:lstStyle/>
+          <a:p>
+            <a:r>
+              <a:rPr lang="sv-SE" sz="2400" dirty="0"/>
+              <a:t>Generiska maträtter</a:t>
+            </a:r>
+          </a:p>
+          <a:p>
+            <a:r>
+              <a:rPr lang="sv-SE" sz="2400" dirty="0"/>
+              <a:t>Optimerad prissättning</a:t>
+            </a:r>
+          </a:p>
+          <a:p>
+            <a:r>
+              <a:rPr lang="sv-SE" sz="2400" dirty="0"/>
+              <a:t>Kundnöjdhet</a:t>
+            </a:r>
+          </a:p>
+          <a:p>
+            <a:r>
+              <a:rPr lang="sv-SE" sz="2400" dirty="0"/>
+              <a:t>Personalplacering</a:t>
+            </a:r>
+          </a:p>
+          <a:p>
+            <a:r>
+              <a:rPr lang="sv-SE" sz="2400" dirty="0"/>
+              <a:t>Nettointäkter</a:t>
+            </a:r>
+          </a:p>
+          <a:p>
+            <a:r>
+              <a:rPr lang="sv-SE" sz="2400" dirty="0"/>
+              <a:t>Inköpsplanering</a:t>
+            </a:r>
+          </a:p>
+          <a:p>
+            <a:r>
+              <a:rPr lang="sv-SE" sz="2400" dirty="0" err="1"/>
+              <a:t>Dashboard</a:t>
+            </a:r>
+            <a:r>
+              <a:rPr lang="sv-SE" sz="2400" dirty="0"/>
+              <a:t> till köket</a:t>
+            </a:r>
+          </a:p>
+          <a:p>
+            <a:r>
+              <a:rPr lang="sv-SE" sz="2400" dirty="0" err="1"/>
+              <a:t>IoT</a:t>
+            </a:r>
+            <a:endParaRPr lang="sv-SE" sz="2400" dirty="0"/>
+          </a:p>
+          <a:p>
+            <a:endParaRPr lang="sv-SE" sz="2400" dirty="0"/>
+          </a:p>
+        </p:txBody>
+      </p:sp>
+    </p:spTree>
+    <p:extLst>
+      <p:ext uri="{BB962C8B-B14F-4D97-AF65-F5344CB8AC3E}">
+        <p14:creationId xmlns:p14="http://schemas.microsoft.com/office/powerpoint/2010/main" val="4013518900"/>
       </p:ext>
     </p:extLst>
   </p:cSld>

</xml_diff>